<commit_message>
Small change to PPT
</commit_message>
<xml_diff>
--- a/The Next Big Sound_ Using Data Science to Predict Hit Songs.pptx
+++ b/The Next Big Sound_ Using Data Science to Predict Hit Songs.pptx
@@ -10036,8 +10036,64 @@
         </p:blipFill>
         <p:spPr>
           <a:xfrm>
-            <a:off x="3803150" y="977950"/>
+            <a:off x="1649825" y="968550"/>
             <a:ext cx="2027625" cy="3949301"/>
+          </a:xfrm>
+          <a:prstGeom prst="rect">
+            <a:avLst/>
+          </a:prstGeom>
+          <a:noFill/>
+          <a:ln>
+            <a:noFill/>
+          </a:ln>
+        </p:spPr>
+      </p:pic>
+      <p:pic>
+        <p:nvPicPr>
+          <p:cNvPr id="196" name="Google Shape;196;p22"/>
+          <p:cNvPicPr preferRelativeResize="0"/>
+          <p:nvPr/>
+        </p:nvPicPr>
+        <p:blipFill>
+          <a:blip r:embed="rId4">
+            <a:alphaModFix/>
+          </a:blip>
+          <a:stretch>
+            <a:fillRect/>
+          </a:stretch>
+        </p:blipFill>
+        <p:spPr>
+          <a:xfrm>
+            <a:off x="4518900" y="2261850"/>
+            <a:ext cx="3874075" cy="2655441"/>
+          </a:xfrm>
+          <a:prstGeom prst="rect">
+            <a:avLst/>
+          </a:prstGeom>
+          <a:noFill/>
+          <a:ln>
+            <a:noFill/>
+          </a:ln>
+        </p:spPr>
+      </p:pic>
+      <p:pic>
+        <p:nvPicPr>
+          <p:cNvPr id="197" name="Google Shape;197;p22"/>
+          <p:cNvPicPr preferRelativeResize="0"/>
+          <p:nvPr/>
+        </p:nvPicPr>
+        <p:blipFill>
+          <a:blip r:embed="rId5">
+            <a:alphaModFix/>
+          </a:blip>
+          <a:stretch>
+            <a:fillRect/>
+          </a:stretch>
+        </p:blipFill>
+        <p:spPr>
+          <a:xfrm>
+            <a:off x="4518888" y="969100"/>
+            <a:ext cx="3874099" cy="1185200"/>
           </a:xfrm>
           <a:prstGeom prst="rect">
             <a:avLst/>

</xml_diff>